<commit_message>
Fix display of disposing Huldra feat. Display r144f button on e203 if warrior boy held.
</commit_message>
<xml_diff>
--- a/DesignDocs/Barbarian Prince Design.pptx
+++ b/DesignDocs/Barbarian Prince Design.pptx
@@ -281,7 +281,7 @@
           <a:p>
             <a:fld id="{CD1D3655-D92B-44A0-848C-AF72CB5F4078}" type="datetimeFigureOut">
               <a:rPr lang="en-US" smtClean="0"/>
-              <a:t>5/5/2024</a:t>
+              <a:t>11/30/2024</a:t>
             </a:fld>
             <a:endParaRPr lang="en-US"/>
           </a:p>
@@ -479,7 +479,7 @@
           <a:p>
             <a:fld id="{CD1D3655-D92B-44A0-848C-AF72CB5F4078}" type="datetimeFigureOut">
               <a:rPr lang="en-US" smtClean="0"/>
-              <a:t>5/5/2024</a:t>
+              <a:t>11/30/2024</a:t>
             </a:fld>
             <a:endParaRPr lang="en-US"/>
           </a:p>
@@ -687,7 +687,7 @@
           <a:p>
             <a:fld id="{CD1D3655-D92B-44A0-848C-AF72CB5F4078}" type="datetimeFigureOut">
               <a:rPr lang="en-US" smtClean="0"/>
-              <a:t>5/5/2024</a:t>
+              <a:t>11/30/2024</a:t>
             </a:fld>
             <a:endParaRPr lang="en-US"/>
           </a:p>
@@ -885,7 +885,7 @@
           <a:p>
             <a:fld id="{CD1D3655-D92B-44A0-848C-AF72CB5F4078}" type="datetimeFigureOut">
               <a:rPr lang="en-US" smtClean="0"/>
-              <a:t>5/5/2024</a:t>
+              <a:t>11/30/2024</a:t>
             </a:fld>
             <a:endParaRPr lang="en-US"/>
           </a:p>
@@ -1160,7 +1160,7 @@
           <a:p>
             <a:fld id="{CD1D3655-D92B-44A0-848C-AF72CB5F4078}" type="datetimeFigureOut">
               <a:rPr lang="en-US" smtClean="0"/>
-              <a:t>5/5/2024</a:t>
+              <a:t>11/30/2024</a:t>
             </a:fld>
             <a:endParaRPr lang="en-US"/>
           </a:p>
@@ -1425,7 +1425,7 @@
           <a:p>
             <a:fld id="{CD1D3655-D92B-44A0-848C-AF72CB5F4078}" type="datetimeFigureOut">
               <a:rPr lang="en-US" smtClean="0"/>
-              <a:t>5/5/2024</a:t>
+              <a:t>11/30/2024</a:t>
             </a:fld>
             <a:endParaRPr lang="en-US"/>
           </a:p>
@@ -1837,7 +1837,7 @@
           <a:p>
             <a:fld id="{CD1D3655-D92B-44A0-848C-AF72CB5F4078}" type="datetimeFigureOut">
               <a:rPr lang="en-US" smtClean="0"/>
-              <a:t>5/5/2024</a:t>
+              <a:t>11/30/2024</a:t>
             </a:fld>
             <a:endParaRPr lang="en-US"/>
           </a:p>
@@ -1978,7 +1978,7 @@
           <a:p>
             <a:fld id="{CD1D3655-D92B-44A0-848C-AF72CB5F4078}" type="datetimeFigureOut">
               <a:rPr lang="en-US" smtClean="0"/>
-              <a:t>5/5/2024</a:t>
+              <a:t>11/30/2024</a:t>
             </a:fld>
             <a:endParaRPr lang="en-US"/>
           </a:p>
@@ -2091,7 +2091,7 @@
           <a:p>
             <a:fld id="{CD1D3655-D92B-44A0-848C-AF72CB5F4078}" type="datetimeFigureOut">
               <a:rPr lang="en-US" smtClean="0"/>
-              <a:t>5/5/2024</a:t>
+              <a:t>11/30/2024</a:t>
             </a:fld>
             <a:endParaRPr lang="en-US"/>
           </a:p>
@@ -2402,7 +2402,7 @@
           <a:p>
             <a:fld id="{CD1D3655-D92B-44A0-848C-AF72CB5F4078}" type="datetimeFigureOut">
               <a:rPr lang="en-US" smtClean="0"/>
-              <a:t>5/5/2024</a:t>
+              <a:t>11/30/2024</a:t>
             </a:fld>
             <a:endParaRPr lang="en-US"/>
           </a:p>
@@ -2690,7 +2690,7 @@
           <a:p>
             <a:fld id="{CD1D3655-D92B-44A0-848C-AF72CB5F4078}" type="datetimeFigureOut">
               <a:rPr lang="en-US" smtClean="0"/>
-              <a:t>5/5/2024</a:t>
+              <a:t>11/30/2024</a:t>
             </a:fld>
             <a:endParaRPr lang="en-US"/>
           </a:p>
@@ -2931,7 +2931,7 @@
           <a:p>
             <a:fld id="{CD1D3655-D92B-44A0-848C-AF72CB5F4078}" type="datetimeFigureOut">
               <a:rPr lang="en-US" smtClean="0"/>
-              <a:t>5/5/2024</a:t>
+              <a:t>11/30/2024</a:t>
             </a:fld>
             <a:endParaRPr lang="en-US"/>
           </a:p>
@@ -5021,7 +5021,7 @@
         </p:nvSpPr>
         <p:spPr>
           <a:xfrm>
-            <a:off x="838200" y="988291"/>
+            <a:off x="956518" y="988291"/>
             <a:ext cx="10515600" cy="5188672"/>
           </a:xfrm>
         </p:spPr>
@@ -5094,7 +5094,7 @@
           <a:p>
             <a:r>
               <a:rPr lang="en-US" sz="1400" dirty="0"/>
-              <a:t>Save file as Events.txt</a:t>
+              <a:t>Save file as Events.txt in config directory</a:t>
             </a:r>
           </a:p>
           <a:p>
@@ -5124,13 +5124,26 @@
             </a:r>
           </a:p>
           <a:p>
-            <a:pPr lvl="1"/>
-            <a:r>
-              <a:rPr lang="en-US" sz="1000" dirty="0"/>
-              <a:t>Can do a Save As to an Events.xlsx so that you do not have to exit Excel</a:t>
-            </a:r>
-          </a:p>
-          <a:p>
+            <a:r>
+              <a:rPr lang="en-US" sz="1400" dirty="0"/>
+              <a:t>Use “Save As” to save the </a:t>
+            </a:r>
+            <a:r>
+              <a:rPr lang="en-US" sz="1400" b="1" dirty="0"/>
+              <a:t>xlsx</a:t>
+            </a:r>
+            <a:r>
+              <a:rPr lang="en-US" sz="1400" dirty="0"/>
+              <a:t> file in the </a:t>
+            </a:r>
+            <a:r>
+              <a:rPr lang="en-US" sz="1400" dirty="0" err="1"/>
+              <a:t>DesignDocs</a:t>
+            </a:r>
+            <a:r>
+              <a:rPr lang="en-US" sz="1400" dirty="0"/>
+              <a:t> directory</a:t>
+            </a:r>
             <a:endParaRPr lang="en-US" sz="1200" dirty="0"/>
           </a:p>
           <a:p>
@@ -5226,8 +5239,8 @@
         </p:nvSpPr>
         <p:spPr>
           <a:xfrm>
-            <a:off x="6948775" y="1720561"/>
-            <a:ext cx="3546764" cy="612648"/>
+            <a:off x="6948775" y="1720560"/>
+            <a:ext cx="3499239" cy="911321"/>
           </a:xfrm>
           <a:prstGeom prst="wedgeRoundRectCallout">
             <a:avLst>
@@ -5289,7 +5302,7 @@
                   <a:schemeClr val="tx1"/>
                 </a:solidFill>
               </a:rPr>
-              <a:t> to Event.txt file for application to read.</a:t>
+              <a:t> to Event.txt file for application to read. Same applies to Rules.txt and Tables.txt.</a:t>
             </a:r>
           </a:p>
         </p:txBody>

</xml_diff>